<commit_message>
update overview image and reorder nav bar
</commit_message>
<xml_diff>
--- a/docs/images/overview-quantil.pptx
+++ b/docs/images/overview-quantil.pptx
@@ -259,7 +259,7 @@
           <a:p>
             <a:fld id="{16C6B445-69E6-4628-96A8-2B131D625ECD}" type="datetimeFigureOut">
               <a:rPr lang="de-DE" smtClean="0"/>
-              <a:t>25.02.21</a:t>
+              <a:t>10.03.21</a:t>
             </a:fld>
             <a:endParaRPr lang="de-DE"/>
           </a:p>
@@ -457,7 +457,7 @@
           <a:p>
             <a:fld id="{16C6B445-69E6-4628-96A8-2B131D625ECD}" type="datetimeFigureOut">
               <a:rPr lang="de-DE" smtClean="0"/>
-              <a:t>25.02.21</a:t>
+              <a:t>10.03.21</a:t>
             </a:fld>
             <a:endParaRPr lang="de-DE"/>
           </a:p>
@@ -665,7 +665,7 @@
           <a:p>
             <a:fld id="{16C6B445-69E6-4628-96A8-2B131D625ECD}" type="datetimeFigureOut">
               <a:rPr lang="de-DE" smtClean="0"/>
-              <a:t>25.02.21</a:t>
+              <a:t>10.03.21</a:t>
             </a:fld>
             <a:endParaRPr lang="de-DE"/>
           </a:p>
@@ -863,7 +863,7 @@
           <a:p>
             <a:fld id="{16C6B445-69E6-4628-96A8-2B131D625ECD}" type="datetimeFigureOut">
               <a:rPr lang="de-DE" smtClean="0"/>
-              <a:t>25.02.21</a:t>
+              <a:t>10.03.21</a:t>
             </a:fld>
             <a:endParaRPr lang="de-DE"/>
           </a:p>
@@ -1138,7 +1138,7 @@
           <a:p>
             <a:fld id="{16C6B445-69E6-4628-96A8-2B131D625ECD}" type="datetimeFigureOut">
               <a:rPr lang="de-DE" smtClean="0"/>
-              <a:t>25.02.21</a:t>
+              <a:t>10.03.21</a:t>
             </a:fld>
             <a:endParaRPr lang="de-DE"/>
           </a:p>
@@ -1403,7 +1403,7 @@
           <a:p>
             <a:fld id="{16C6B445-69E6-4628-96A8-2B131D625ECD}" type="datetimeFigureOut">
               <a:rPr lang="de-DE" smtClean="0"/>
-              <a:t>25.02.21</a:t>
+              <a:t>10.03.21</a:t>
             </a:fld>
             <a:endParaRPr lang="de-DE"/>
           </a:p>
@@ -1815,7 +1815,7 @@
           <a:p>
             <a:fld id="{16C6B445-69E6-4628-96A8-2B131D625ECD}" type="datetimeFigureOut">
               <a:rPr lang="de-DE" smtClean="0"/>
-              <a:t>25.02.21</a:t>
+              <a:t>10.03.21</a:t>
             </a:fld>
             <a:endParaRPr lang="de-DE"/>
           </a:p>
@@ -1956,7 +1956,7 @@
           <a:p>
             <a:fld id="{16C6B445-69E6-4628-96A8-2B131D625ECD}" type="datetimeFigureOut">
               <a:rPr lang="de-DE" smtClean="0"/>
-              <a:t>25.02.21</a:t>
+              <a:t>10.03.21</a:t>
             </a:fld>
             <a:endParaRPr lang="de-DE"/>
           </a:p>
@@ -2069,7 +2069,7 @@
           <a:p>
             <a:fld id="{16C6B445-69E6-4628-96A8-2B131D625ECD}" type="datetimeFigureOut">
               <a:rPr lang="de-DE" smtClean="0"/>
-              <a:t>25.02.21</a:t>
+              <a:t>10.03.21</a:t>
             </a:fld>
             <a:endParaRPr lang="de-DE"/>
           </a:p>
@@ -2380,7 +2380,7 @@
           <a:p>
             <a:fld id="{16C6B445-69E6-4628-96A8-2B131D625ECD}" type="datetimeFigureOut">
               <a:rPr lang="de-DE" smtClean="0"/>
-              <a:t>25.02.21</a:t>
+              <a:t>10.03.21</a:t>
             </a:fld>
             <a:endParaRPr lang="de-DE"/>
           </a:p>
@@ -2668,7 +2668,7 @@
           <a:p>
             <a:fld id="{16C6B445-69E6-4628-96A8-2B131D625ECD}" type="datetimeFigureOut">
               <a:rPr lang="de-DE" smtClean="0"/>
-              <a:t>25.02.21</a:t>
+              <a:t>10.03.21</a:t>
             </a:fld>
             <a:endParaRPr lang="de-DE"/>
           </a:p>
@@ -2909,7 +2909,7 @@
           <a:p>
             <a:fld id="{16C6B445-69E6-4628-96A8-2B131D625ECD}" type="datetimeFigureOut">
               <a:rPr lang="de-DE" smtClean="0"/>
-              <a:t>25.02.21</a:t>
+              <a:t>10.03.21</a:t>
             </a:fld>
             <a:endParaRPr lang="de-DE"/>
           </a:p>
@@ -4256,8 +4256,8 @@
         </p:nvSpPr>
         <p:spPr>
           <a:xfrm>
-            <a:off x="2099019" y="1872580"/>
-            <a:ext cx="1445204" cy="1292662"/>
+            <a:off x="2072570" y="1872580"/>
+            <a:ext cx="1498102" cy="1292662"/>
           </a:xfrm>
           <a:prstGeom prst="rect">
             <a:avLst/>
@@ -4272,30 +4272,30 @@
           <a:p>
             <a:pPr algn="ctr"/>
             <a:r>
-              <a:rPr lang="en-US"/>
-              <a:t>QCAtlas</a:t>
+              <a:rPr lang="en-US" dirty="0"/>
+              <a:t>QC Atlas</a:t>
             </a:r>
           </a:p>
           <a:p>
             <a:pPr algn="ctr"/>
-            <a:endParaRPr lang="en-US" sz="1200"/>
+            <a:endParaRPr lang="en-US" sz="1200" dirty="0"/>
           </a:p>
           <a:p>
             <a:pPr algn="ctr"/>
             <a:r>
-              <a:rPr lang="en-US"/>
+              <a:rPr lang="en-US" dirty="0"/>
               <a:t>Qverview</a:t>
             </a:r>
           </a:p>
           <a:p>
             <a:pPr algn="ctr"/>
-            <a:endParaRPr lang="en-US" sz="1200"/>
+            <a:endParaRPr lang="en-US" sz="1200" dirty="0"/>
           </a:p>
           <a:p>
             <a:pPr algn="ctr"/>
             <a:r>
-              <a:rPr lang="en-US"/>
-              <a:t>PatternAtlas*</a:t>
+              <a:rPr lang="en-US" dirty="0"/>
+              <a:t>Pattern Atlas*</a:t>
             </a:r>
           </a:p>
         </p:txBody>
@@ -4331,7 +4331,7 @@
             <a:pPr algn="ctr"/>
             <a:r>
               <a:rPr lang="en-US" dirty="0"/>
-              <a:t>QHana</a:t>
+              <a:t>QHAna</a:t>
             </a:r>
           </a:p>
         </p:txBody>

</xml_diff>

<commit_message>
add library to pptx
Signed-off-by: Marvin Bechtold <marvin.bechtold.dev@gmail.com>
</commit_message>
<xml_diff>
--- a/docs/images/overview-quantil.pptx
+++ b/docs/images/overview-quantil.pptx
@@ -259,7 +259,7 @@
           <a:p>
             <a:fld id="{16C6B445-69E6-4628-96A8-2B131D625ECD}" type="datetimeFigureOut">
               <a:rPr lang="de-DE" smtClean="0"/>
-              <a:t>10.03.21</a:t>
+              <a:t>27.07.22</a:t>
             </a:fld>
             <a:endParaRPr lang="de-DE"/>
           </a:p>
@@ -457,7 +457,7 @@
           <a:p>
             <a:fld id="{16C6B445-69E6-4628-96A8-2B131D625ECD}" type="datetimeFigureOut">
               <a:rPr lang="de-DE" smtClean="0"/>
-              <a:t>10.03.21</a:t>
+              <a:t>27.07.22</a:t>
             </a:fld>
             <a:endParaRPr lang="de-DE"/>
           </a:p>
@@ -665,7 +665,7 @@
           <a:p>
             <a:fld id="{16C6B445-69E6-4628-96A8-2B131D625ECD}" type="datetimeFigureOut">
               <a:rPr lang="de-DE" smtClean="0"/>
-              <a:t>10.03.21</a:t>
+              <a:t>27.07.22</a:t>
             </a:fld>
             <a:endParaRPr lang="de-DE"/>
           </a:p>
@@ -863,7 +863,7 @@
           <a:p>
             <a:fld id="{16C6B445-69E6-4628-96A8-2B131D625ECD}" type="datetimeFigureOut">
               <a:rPr lang="de-DE" smtClean="0"/>
-              <a:t>10.03.21</a:t>
+              <a:t>27.07.22</a:t>
             </a:fld>
             <a:endParaRPr lang="de-DE"/>
           </a:p>
@@ -1138,7 +1138,7 @@
           <a:p>
             <a:fld id="{16C6B445-69E6-4628-96A8-2B131D625ECD}" type="datetimeFigureOut">
               <a:rPr lang="de-DE" smtClean="0"/>
-              <a:t>10.03.21</a:t>
+              <a:t>27.07.22</a:t>
             </a:fld>
             <a:endParaRPr lang="de-DE"/>
           </a:p>
@@ -1403,7 +1403,7 @@
           <a:p>
             <a:fld id="{16C6B445-69E6-4628-96A8-2B131D625ECD}" type="datetimeFigureOut">
               <a:rPr lang="de-DE" smtClean="0"/>
-              <a:t>10.03.21</a:t>
+              <a:t>27.07.22</a:t>
             </a:fld>
             <a:endParaRPr lang="de-DE"/>
           </a:p>
@@ -1815,7 +1815,7 @@
           <a:p>
             <a:fld id="{16C6B445-69E6-4628-96A8-2B131D625ECD}" type="datetimeFigureOut">
               <a:rPr lang="de-DE" smtClean="0"/>
-              <a:t>10.03.21</a:t>
+              <a:t>27.07.22</a:t>
             </a:fld>
             <a:endParaRPr lang="de-DE"/>
           </a:p>
@@ -1956,7 +1956,7 @@
           <a:p>
             <a:fld id="{16C6B445-69E6-4628-96A8-2B131D625ECD}" type="datetimeFigureOut">
               <a:rPr lang="de-DE" smtClean="0"/>
-              <a:t>10.03.21</a:t>
+              <a:t>27.07.22</a:t>
             </a:fld>
             <a:endParaRPr lang="de-DE"/>
           </a:p>
@@ -2069,7 +2069,7 @@
           <a:p>
             <a:fld id="{16C6B445-69E6-4628-96A8-2B131D625ECD}" type="datetimeFigureOut">
               <a:rPr lang="de-DE" smtClean="0"/>
-              <a:t>10.03.21</a:t>
+              <a:t>27.07.22</a:t>
             </a:fld>
             <a:endParaRPr lang="de-DE"/>
           </a:p>
@@ -2380,7 +2380,7 @@
           <a:p>
             <a:fld id="{16C6B445-69E6-4628-96A8-2B131D625ECD}" type="datetimeFigureOut">
               <a:rPr lang="de-DE" smtClean="0"/>
-              <a:t>10.03.21</a:t>
+              <a:t>27.07.22</a:t>
             </a:fld>
             <a:endParaRPr lang="de-DE"/>
           </a:p>
@@ -2668,7 +2668,7 @@
           <a:p>
             <a:fld id="{16C6B445-69E6-4628-96A8-2B131D625ECD}" type="datetimeFigureOut">
               <a:rPr lang="de-DE" smtClean="0"/>
-              <a:t>10.03.21</a:t>
+              <a:t>27.07.22</a:t>
             </a:fld>
             <a:endParaRPr lang="de-DE"/>
           </a:p>
@@ -2909,7 +2909,7 @@
           <a:p>
             <a:fld id="{16C6B445-69E6-4628-96A8-2B131D625ECD}" type="datetimeFigureOut">
               <a:rPr lang="de-DE" smtClean="0"/>
-              <a:t>10.03.21</a:t>
+              <a:t>27.07.22</a:t>
             </a:fld>
             <a:endParaRPr lang="de-DE"/>
           </a:p>
@@ -4257,7 +4257,7 @@
         <p:spPr>
           <a:xfrm>
             <a:off x="2072570" y="1872580"/>
-            <a:ext cx="1498102" cy="1292662"/>
+            <a:ext cx="1498102" cy="1754326"/>
           </a:xfrm>
           <a:prstGeom prst="rect">
             <a:avLst/>
@@ -4283,8 +4283,20 @@
           <a:p>
             <a:pPr algn="ctr"/>
             <a:r>
+              <a:rPr lang="en-US" dirty="0" err="1"/>
+              <a:t>Qverview</a:t>
+            </a:r>
+            <a:endParaRPr lang="en-US" dirty="0"/>
+          </a:p>
+          <a:p>
+            <a:pPr algn="ctr"/>
+            <a:endParaRPr lang="en-US" sz="1200" dirty="0"/>
+          </a:p>
+          <a:p>
+            <a:pPr algn="ctr"/>
+            <a:r>
               <a:rPr lang="en-US" dirty="0"/>
-              <a:t>Qverview</a:t>
+              <a:t>Library</a:t>
             </a:r>
           </a:p>
           <a:p>

</xml_diff>